<commit_message>
Aggiunta logo Unipd classico
</commit_message>
<xml_diff>
--- a/Presentazioni/THRUST-Depliant per aziende Ufficiale.pptx
+++ b/Presentazioni/THRUST-Depliant per aziende Ufficiale.pptx
@@ -281,7 +281,7 @@
           <a:p>
             <a:fld id="{BE668B7C-E4CD-4872-B084-44133F808FCE}" type="datetimeFigureOut">
               <a:rPr lang="en-US" smtClean="0"/>
-              <a:t>2/8/2023</a:t>
+              <a:t>4/27/2023</a:t>
             </a:fld>
             <a:endParaRPr lang="en-US" dirty="0"/>
           </a:p>
@@ -458,7 +458,7 @@
           <a:p>
             <a:fld id="{6733D5BD-E30B-48AB-B24F-3878C333D518}" type="datetimeFigureOut">
               <a:rPr lang="en-US" smtClean="0"/>
-              <a:t>2/8/2023</a:t>
+              <a:t>4/27/2023</a:t>
             </a:fld>
             <a:endParaRPr lang="en-US" dirty="0"/>
           </a:p>
@@ -1478,7 +1478,7 @@
           <a:p>
             <a:fld id="{322F25CD-2047-4F5E-8792-D76BF06C8E86}" type="datetimeFigureOut">
               <a:rPr lang="it-IT" smtClean="0"/>
-              <a:t>08/02/2023</a:t>
+              <a:t>27/04/2023</a:t>
             </a:fld>
             <a:endParaRPr lang="it-IT"/>
           </a:p>
@@ -1573,7 +1573,7 @@
           <a:p>
             <a:fld id="{322F25CD-2047-4F5E-8792-D76BF06C8E86}" type="datetimeFigureOut">
               <a:rPr lang="it-IT" smtClean="0"/>
-              <a:t>08/02/2023</a:t>
+              <a:t>27/04/2023</a:t>
             </a:fld>
             <a:endParaRPr lang="it-IT"/>
           </a:p>
@@ -1850,7 +1850,7 @@
           <a:p>
             <a:fld id="{322F25CD-2047-4F5E-8792-D76BF06C8E86}" type="datetimeFigureOut">
               <a:rPr lang="it-IT" smtClean="0"/>
-              <a:t>08/02/2023</a:t>
+              <a:t>27/04/2023</a:t>
             </a:fld>
             <a:endParaRPr lang="it-IT"/>
           </a:p>
@@ -2107,7 +2107,7 @@
           <a:p>
             <a:fld id="{322F25CD-2047-4F5E-8792-D76BF06C8E86}" type="datetimeFigureOut">
               <a:rPr lang="it-IT" smtClean="0"/>
-              <a:t>08/02/2023</a:t>
+              <a:t>27/04/2023</a:t>
             </a:fld>
             <a:endParaRPr lang="it-IT"/>
           </a:p>
@@ -2277,7 +2277,7 @@
           <a:p>
             <a:fld id="{322F25CD-2047-4F5E-8792-D76BF06C8E86}" type="datetimeFigureOut">
               <a:rPr lang="it-IT" smtClean="0"/>
-              <a:t>08/02/2023</a:t>
+              <a:t>27/04/2023</a:t>
             </a:fld>
             <a:endParaRPr lang="it-IT"/>
           </a:p>
@@ -2457,7 +2457,7 @@
           <a:p>
             <a:fld id="{322F25CD-2047-4F5E-8792-D76BF06C8E86}" type="datetimeFigureOut">
               <a:rPr lang="it-IT" smtClean="0"/>
-              <a:t>08/02/2023</a:t>
+              <a:t>27/04/2023</a:t>
             </a:fld>
             <a:endParaRPr lang="it-IT"/>
           </a:p>
@@ -6302,7 +6302,7 @@
           <a:p>
             <a:fld id="{322F25CD-2047-4F5E-8792-D76BF06C8E86}" type="datetimeFigureOut">
               <a:rPr lang="it-IT" smtClean="0"/>
-              <a:t>08/02/2023</a:t>
+              <a:t>27/04/2023</a:t>
             </a:fld>
             <a:endParaRPr lang="it-IT"/>
           </a:p>
@@ -6472,7 +6472,7 @@
           <a:p>
             <a:fld id="{322F25CD-2047-4F5E-8792-D76BF06C8E86}" type="datetimeFigureOut">
               <a:rPr lang="it-IT" smtClean="0"/>
-              <a:t>08/02/2023</a:t>
+              <a:t>27/04/2023</a:t>
             </a:fld>
             <a:endParaRPr lang="it-IT"/>
           </a:p>
@@ -6718,7 +6718,7 @@
           <a:p>
             <a:fld id="{322F25CD-2047-4F5E-8792-D76BF06C8E86}" type="datetimeFigureOut">
               <a:rPr lang="it-IT" smtClean="0"/>
-              <a:t>08/02/2023</a:t>
+              <a:t>27/04/2023</a:t>
             </a:fld>
             <a:endParaRPr lang="it-IT"/>
           </a:p>
@@ -6950,7 +6950,7 @@
           <a:p>
             <a:fld id="{322F25CD-2047-4F5E-8792-D76BF06C8E86}" type="datetimeFigureOut">
               <a:rPr lang="it-IT" smtClean="0"/>
-              <a:t>08/02/2023</a:t>
+              <a:t>27/04/2023</a:t>
             </a:fld>
             <a:endParaRPr lang="it-IT"/>
           </a:p>
@@ -7317,7 +7317,7 @@
           <a:p>
             <a:fld id="{322F25CD-2047-4F5E-8792-D76BF06C8E86}" type="datetimeFigureOut">
               <a:rPr lang="it-IT" smtClean="0"/>
-              <a:t>08/02/2023</a:t>
+              <a:t>27/04/2023</a:t>
             </a:fld>
             <a:endParaRPr lang="it-IT"/>
           </a:p>
@@ -8042,7 +8042,7 @@
           <a:p>
             <a:fld id="{322F25CD-2047-4F5E-8792-D76BF06C8E86}" type="datetimeFigureOut">
               <a:rPr lang="it-IT" smtClean="0"/>
-              <a:t>08/02/2023</a:t>
+              <a:t>27/04/2023</a:t>
             </a:fld>
             <a:endParaRPr lang="it-IT"/>
           </a:p>
@@ -9234,10 +9234,10 @@
       </p:pic>
       <p:pic>
         <p:nvPicPr>
-          <p:cNvPr id="25" name="Immagine 24">
+          <p:cNvPr id="11" name="Immagine 10">
             <a:extLst>
               <a:ext uri="{FF2B5EF4-FFF2-40B4-BE49-F238E27FC236}">
-                <a16:creationId xmlns:a16="http://schemas.microsoft.com/office/drawing/2014/main" id="{3AFE7160-2279-D110-150E-696C9D60CEA2}"/>
+                <a16:creationId xmlns:a16="http://schemas.microsoft.com/office/drawing/2014/main" id="{6F5AA271-9ABC-98C3-E947-C9EF98ABB049}"/>
               </a:ext>
             </a:extLst>
           </p:cNvPr>
@@ -9254,8 +9254,8 @@
         </p:blipFill>
         <p:spPr>
           <a:xfrm>
-            <a:off x="3863641" y="6532134"/>
-            <a:ext cx="2312960" cy="649947"/>
+            <a:off x="3470710" y="5663807"/>
+            <a:ext cx="493780" cy="280030"/>
           </a:xfrm>
           <a:prstGeom prst="rect">
             <a:avLst/>
@@ -9264,10 +9264,10 @@
       </p:pic>
       <p:pic>
         <p:nvPicPr>
-          <p:cNvPr id="11" name="Immagine 10">
+          <p:cNvPr id="9" name="Immagine 8" descr="Immagine che contiene logo&#10;&#10;Descrizione generata automaticamente">
             <a:extLst>
               <a:ext uri="{FF2B5EF4-FFF2-40B4-BE49-F238E27FC236}">
-                <a16:creationId xmlns:a16="http://schemas.microsoft.com/office/drawing/2014/main" id="{6F5AA271-9ABC-98C3-E947-C9EF98ABB049}"/>
+                <a16:creationId xmlns:a16="http://schemas.microsoft.com/office/drawing/2014/main" id="{B510A259-EEE4-BEF3-AD99-7C0180574975}"/>
               </a:ext>
             </a:extLst>
           </p:cNvPr>
@@ -9284,8 +9284,8 @@
         </p:blipFill>
         <p:spPr>
           <a:xfrm>
-            <a:off x="3470710" y="5663807"/>
-            <a:ext cx="493780" cy="280030"/>
+            <a:off x="3707972" y="6336300"/>
+            <a:ext cx="1865567" cy="834498"/>
           </a:xfrm>
           <a:prstGeom prst="rect">
             <a:avLst/>
@@ -9462,7 +9462,7 @@
                 <a:ea typeface="Calibri" panose="020F0502020204030204" pitchFamily="34" charset="0"/>
                 <a:cs typeface="Times New Roman" panose="02020603050405020304" pitchFamily="18" charset="0"/>
               </a:rPr>
-              <a:t>sarà il primo</a:t>
+              <a:t>sarà uno dei primi </a:t>
             </a:r>
             <a:r>
               <a:rPr lang="it-IT" sz="4400" dirty="0">
@@ -9471,7 +9471,7 @@
                 <a:ea typeface="Calibri" panose="020F0502020204030204" pitchFamily="34" charset="0"/>
                 <a:cs typeface="Times New Roman" panose="02020603050405020304" pitchFamily="18" charset="0"/>
               </a:rPr>
-              <a:t> razzo sonda a propulsione ibrida a volare in Italia completamente sviluppato da studenti.</a:t>
+              <a:t>razzo sonda a propulsione ibrida a volare in Italia completamente sviluppato da studenti.</a:t>
             </a:r>
           </a:p>
           <a:p>
@@ -12056,6 +12056,23 @@
 </file>
 
 <file path=customXml/item1.xml><?xml version="1.0" encoding="utf-8"?>
+<p:properties xmlns:p="http://schemas.microsoft.com/office/2006/metadata/properties" xmlns:xsi="http://www.w3.org/2001/XMLSchema-instance" xmlns:pc="http://schemas.microsoft.com/office/infopath/2007/PartnerControls">
+  <documentManagement>
+    <_activity xmlns="7a16f221-e504-499d-b2e4-931f08cebc41" xsi:nil="true"/>
+  </documentManagement>
+</p:properties>
+</file>
+
+<file path=customXml/item2.xml><?xml version="1.0" encoding="utf-8"?>
+<?mso-contentType ?>
+<FormTemplates xmlns="http://schemas.microsoft.com/sharepoint/v3/contenttype/forms">
+  <Display>DocumentLibraryForm</Display>
+  <Edit>DocumentLibraryForm</Edit>
+  <New>DocumentLibraryForm</New>
+</FormTemplates>
+</file>
+
+<file path=customXml/item3.xml><?xml version="1.0" encoding="utf-8"?>
 <ct:contentTypeSchema xmlns:ct="http://schemas.microsoft.com/office/2006/metadata/contentType" xmlns:ma="http://schemas.microsoft.com/office/2006/metadata/properties/metaAttributes" ct:_="" ma:_="" ma:contentTypeName="Documento" ma:contentTypeID="0x010100F276273A4A43F84BA94D9E7D38F2F275" ma:contentTypeVersion="15" ma:contentTypeDescription="Creare un nuovo documento." ma:contentTypeScope="" ma:versionID="e415f274a228bc97f15ef0af92bff48a">
   <xsd:schema xmlns:xsd="http://www.w3.org/2001/XMLSchema" xmlns:xs="http://www.w3.org/2001/XMLSchema" xmlns:p="http://schemas.microsoft.com/office/2006/metadata/properties" xmlns:ns3="7a16f221-e504-499d-b2e4-931f08cebc41" xmlns:ns4="a8fe8da9-0169-4d13-8183-a4208811e2c2" targetNamespace="http://schemas.microsoft.com/office/2006/metadata/properties" ma:root="true" ma:fieldsID="36aadd3b32b049c3055a8dc36aa5eef2" ns3:_="" ns4:_="">
     <xsd:import namespace="7a16f221-e504-499d-b2e4-931f08cebc41"/>
@@ -12290,24 +12307,27 @@
 </ct:contentTypeSchema>
 </file>
 
-<file path=customXml/item2.xml><?xml version="1.0" encoding="utf-8"?>
-<?mso-contentType ?>
-<FormTemplates xmlns="http://schemas.microsoft.com/sharepoint/v3/contenttype/forms">
-  <Display>DocumentLibraryForm</Display>
-  <Edit>DocumentLibraryForm</Edit>
-  <New>DocumentLibraryForm</New>
-</FormTemplates>
+<file path=customXml/itemProps1.xml><?xml version="1.0" encoding="utf-8"?>
+<ds:datastoreItem xmlns:ds="http://schemas.openxmlformats.org/officeDocument/2006/customXml" ds:itemID="{5FD497D9-6EB8-499E-846E-A93F4ED04502}">
+  <ds:schemaRefs>
+    <ds:schemaRef ds:uri="http://schemas.microsoft.com/office/2006/metadata/properties"/>
+    <ds:schemaRef ds:uri="http://www.w3.org/2000/xmlns/"/>
+    <ds:schemaRef ds:uri="7a16f221-e504-499d-b2e4-931f08cebc41"/>
+    <ds:schemaRef ds:uri="http://www.w3.org/2001/XMLSchema-instance"/>
+    <ds:schemaRef ds:uri="http://schemas.microsoft.com/office/infopath/2007/PartnerControls"/>
+  </ds:schemaRefs>
+</ds:datastoreItem>
 </file>
 
-<file path=customXml/item3.xml><?xml version="1.0" encoding="utf-8"?>
-<p:properties xmlns:p="http://schemas.microsoft.com/office/2006/metadata/properties" xmlns:xsi="http://www.w3.org/2001/XMLSchema-instance" xmlns:pc="http://schemas.microsoft.com/office/infopath/2007/PartnerControls">
-  <documentManagement>
-    <_activity xmlns="7a16f221-e504-499d-b2e4-931f08cebc41" xsi:nil="true"/>
-  </documentManagement>
-</p:properties>
+<file path=customXml/itemProps2.xml><?xml version="1.0" encoding="utf-8"?>
+<ds:datastoreItem xmlns:ds="http://schemas.openxmlformats.org/officeDocument/2006/customXml" ds:itemID="{3C21B128-E861-48F9-8C71-AC522F11975F}">
+  <ds:schemaRefs>
+    <ds:schemaRef ds:uri="http://schemas.microsoft.com/sharepoint/v3/contenttype/forms"/>
+  </ds:schemaRefs>
+</ds:datastoreItem>
 </file>
 
-<file path=customXml/itemProps1.xml><?xml version="1.0" encoding="utf-8"?>
+<file path=customXml/itemProps3.xml><?xml version="1.0" encoding="utf-8"?>
 <ds:datastoreItem xmlns:ds="http://schemas.openxmlformats.org/officeDocument/2006/customXml" ds:itemID="{3289F29C-2F1C-4B81-B282-104CA43E8AEB}">
   <ds:schemaRefs>
     <ds:schemaRef ds:uri="http://schemas.microsoft.com/office/2006/metadata/contentType"/>
@@ -12325,24 +12345,4 @@
     <ds:schemaRef ds:uri="http://schemas.microsoft.com/internal/obd"/>
   </ds:schemaRefs>
 </ds:datastoreItem>
-</file>
-
-<file path=customXml/itemProps2.xml><?xml version="1.0" encoding="utf-8"?>
-<ds:datastoreItem xmlns:ds="http://schemas.openxmlformats.org/officeDocument/2006/customXml" ds:itemID="{3C21B128-E861-48F9-8C71-AC522F11975F}">
-  <ds:schemaRefs>
-    <ds:schemaRef ds:uri="http://schemas.microsoft.com/sharepoint/v3/contenttype/forms"/>
-  </ds:schemaRefs>
-</ds:datastoreItem>
-</file>
-
-<file path=customXml/itemProps3.xml><?xml version="1.0" encoding="utf-8"?>
-<ds:datastoreItem xmlns:ds="http://schemas.openxmlformats.org/officeDocument/2006/customXml" ds:itemID="{5FD497D9-6EB8-499E-846E-A93F4ED04502}">
-  <ds:schemaRefs>
-    <ds:schemaRef ds:uri="http://schemas.microsoft.com/office/2006/metadata/properties"/>
-    <ds:schemaRef ds:uri="http://www.w3.org/2000/xmlns/"/>
-    <ds:schemaRef ds:uri="7a16f221-e504-499d-b2e4-931f08cebc41"/>
-    <ds:schemaRef ds:uri="http://www.w3.org/2001/XMLSchema-instance"/>
-    <ds:schemaRef ds:uri="http://schemas.microsoft.com/office/infopath/2007/PartnerControls"/>
-  </ds:schemaRefs>
-</ds:datastoreItem>
 </file>
</xml_diff>